<commit_message>
Adding Updates and Audio
</commit_message>
<xml_diff>
--- a/BDK10-1.pptx
+++ b/BDK10-1.pptx
@@ -6,10 +6,10 @@
     <p:sldMasterId id="2147483836" r:id="rId2"/>
   </p:sldMasterIdLst>
   <p:notesMasterIdLst>
-    <p:notesMasterId r:id="rId21"/>
+    <p:notesMasterId r:id="rId22"/>
   </p:notesMasterIdLst>
   <p:handoutMasterIdLst>
-    <p:handoutMasterId r:id="rId22"/>
+    <p:handoutMasterId r:id="rId23"/>
   </p:handoutMasterIdLst>
   <p:sldIdLst>
     <p:sldId id="256" r:id="rId3"/>
@@ -29,12 +29,13 @@
     <p:sldId id="279" r:id="rId17"/>
     <p:sldId id="286" r:id="rId18"/>
     <p:sldId id="272" r:id="rId19"/>
-    <p:sldId id="287" r:id="rId20"/>
+    <p:sldId id="288" r:id="rId20"/>
+    <p:sldId id="287" r:id="rId21"/>
   </p:sldIdLst>
   <p:sldSz cx="9144000" cy="6858000" type="screen4x3"/>
   <p:notesSz cx="7315200" cy="9601200"/>
   <p:custDataLst>
-    <p:tags r:id="rId23"/>
+    <p:tags r:id="rId24"/>
   </p:custDataLst>
   <p:defaultTextStyle>
     <a:defPPr>
@@ -573,7 +574,7 @@
               </a14:hiddenFill>
             </a:ext>
             <a:ext uri="{FAA26D3D-D897-4be2-8F04-BA451C77F1D7}">
-              <ma14:placeholderFlag xmlns="" xmlns:ma14="http://schemas.microsoft.com/office/mac/drawingml/2011/main" val="1"/>
+              <ma14:placeholderFlag xmlns:ma14="http://schemas.microsoft.com/office/mac/drawingml/2011/main" xmlns="" val="1"/>
             </a:ext>
           </a:extLst>
         </p:spPr>
@@ -1102,7 +1103,7 @@
               </a14:hiddenLine>
             </a:ext>
             <a:ext uri="{FAA26D3D-D897-4be2-8F04-BA451C77F1D7}">
-              <ma14:placeholderFlag xmlns="" xmlns:ma14="http://schemas.microsoft.com/office/mac/drawingml/2011/main" val="1"/>
+              <ma14:placeholderFlag xmlns:ma14="http://schemas.microsoft.com/office/mac/drawingml/2011/main" xmlns="" val="1"/>
             </a:ext>
           </a:extLst>
         </p:spPr>
@@ -1350,7 +1351,7 @@
               </a14:hiddenLine>
             </a:ext>
             <a:ext uri="{FAA26D3D-D897-4be2-8F04-BA451C77F1D7}">
-              <ma14:placeholderFlag xmlns="" xmlns:ma14="http://schemas.microsoft.com/office/mac/drawingml/2011/main" val="1"/>
+              <ma14:placeholderFlag xmlns:ma14="http://schemas.microsoft.com/office/mac/drawingml/2011/main" xmlns="" val="1"/>
             </a:ext>
           </a:extLst>
         </p:spPr>
@@ -1598,7 +1599,7 @@
               </a14:hiddenLine>
             </a:ext>
             <a:ext uri="{FAA26D3D-D897-4be2-8F04-BA451C77F1D7}">
-              <ma14:placeholderFlag xmlns="" xmlns:ma14="http://schemas.microsoft.com/office/mac/drawingml/2011/main" val="1"/>
+              <ma14:placeholderFlag xmlns:ma14="http://schemas.microsoft.com/office/mac/drawingml/2011/main" xmlns="" val="1"/>
             </a:ext>
           </a:extLst>
         </p:spPr>
@@ -1846,7 +1847,7 @@
               </a14:hiddenLine>
             </a:ext>
             <a:ext uri="{FAA26D3D-D897-4be2-8F04-BA451C77F1D7}">
-              <ma14:placeholderFlag xmlns="" xmlns:ma14="http://schemas.microsoft.com/office/mac/drawingml/2011/main" val="1"/>
+              <ma14:placeholderFlag xmlns:ma14="http://schemas.microsoft.com/office/mac/drawingml/2011/main" xmlns="" val="1"/>
             </a:ext>
           </a:extLst>
         </p:spPr>
@@ -2094,7 +2095,7 @@
               </a14:hiddenLine>
             </a:ext>
             <a:ext uri="{FAA26D3D-D897-4be2-8F04-BA451C77F1D7}">
-              <ma14:placeholderFlag xmlns="" xmlns:ma14="http://schemas.microsoft.com/office/mac/drawingml/2011/main" val="1"/>
+              <ma14:placeholderFlag xmlns:ma14="http://schemas.microsoft.com/office/mac/drawingml/2011/main" xmlns="" val="1"/>
             </a:ext>
           </a:extLst>
         </p:spPr>
@@ -2113,6 +2114,254 @@
     <p:extLst>
       <p:ext uri="{BB962C8B-B14F-4D97-AF65-F5344CB8AC3E}">
         <p14:creationId xmlns:p14="http://schemas.microsoft.com/office/powerpoint/2010/main" val="1067418425"/>
+      </p:ext>
+    </p:extLst>
+  </p:cSld>
+  <p:clrMapOvr>
+    <a:masterClrMapping/>
+  </p:clrMapOvr>
+</p:notes>
+</file>
+
+<file path=ppt/notesSlides/notesSlide14.xml><?xml version="1.0" encoding="utf-8"?>
+<p:notes xmlns:a="http://schemas.openxmlformats.org/drawingml/2006/main" xmlns:r="http://schemas.openxmlformats.org/officeDocument/2006/relationships" xmlns:p="http://schemas.openxmlformats.org/presentationml/2006/main">
+  <p:cSld>
+    <p:spTree>
+      <p:nvGrpSpPr>
+        <p:cNvPr id="1" name=""/>
+        <p:cNvGrpSpPr/>
+        <p:nvPr/>
+      </p:nvGrpSpPr>
+      <p:grpSpPr>
+        <a:xfrm>
+          <a:off x="0" y="0"/>
+          <a:ext cx="0" cy="0"/>
+          <a:chOff x="0" y="0"/>
+          <a:chExt cx="0" cy="0"/>
+        </a:xfrm>
+      </p:grpSpPr>
+      <p:sp>
+        <p:nvSpPr>
+          <p:cNvPr id="37890" name="Rectangle 7"/>
+          <p:cNvSpPr>
+            <a:spLocks noGrp="1" noChangeArrowheads="1"/>
+          </p:cNvSpPr>
+          <p:nvPr>
+            <p:ph type="sldNum" sz="quarter" idx="5"/>
+          </p:nvPr>
+        </p:nvSpPr>
+        <p:spPr>
+          <a:noFill/>
+          <a:ln/>
+          <a:extLst>
+            <a:ext uri="{909E8E84-426E-40DD-AFC4-6F175D3DCCD1}">
+              <a14:hiddenFill xmlns:a14="http://schemas.microsoft.com/office/drawing/2010/main">
+                <a:solidFill>
+                  <a:srgbClr val="FFFFFF"/>
+                </a:solidFill>
+              </a14:hiddenFill>
+            </a:ext>
+            <a:ext uri="{91240B29-F687-4F45-9708-019B960494DF}">
+              <a14:hiddenLine xmlns:a14="http://schemas.microsoft.com/office/drawing/2010/main" w="9525">
+                <a:solidFill>
+                  <a:srgbClr val="000000"/>
+                </a:solidFill>
+                <a:miter lim="800000"/>
+                <a:headEnd/>
+                <a:tailEnd/>
+              </a14:hiddenLine>
+            </a:ext>
+          </a:extLst>
+        </p:spPr>
+        <p:txBody>
+          <a:bodyPr/>
+          <a:lstStyle>
+            <a:lvl1pPr eaLnBrk="0" hangingPunct="0">
+              <a:defRPr>
+                <a:solidFill>
+                  <a:schemeClr val="tx1"/>
+                </a:solidFill>
+                <a:latin typeface="Arial" charset="0"/>
+                <a:ea typeface="ＭＳ Ｐゴシック" charset="0"/>
+              </a:defRPr>
+            </a:lvl1pPr>
+            <a:lvl2pPr marL="742950" indent="-285750" eaLnBrk="0" hangingPunct="0">
+              <a:defRPr>
+                <a:solidFill>
+                  <a:schemeClr val="tx1"/>
+                </a:solidFill>
+                <a:latin typeface="Arial" charset="0"/>
+                <a:ea typeface="ＭＳ Ｐゴシック" charset="0"/>
+              </a:defRPr>
+            </a:lvl2pPr>
+            <a:lvl3pPr marL="1143000" indent="-228600" eaLnBrk="0" hangingPunct="0">
+              <a:defRPr>
+                <a:solidFill>
+                  <a:schemeClr val="tx1"/>
+                </a:solidFill>
+                <a:latin typeface="Arial" charset="0"/>
+                <a:ea typeface="ＭＳ Ｐゴシック" charset="0"/>
+              </a:defRPr>
+            </a:lvl3pPr>
+            <a:lvl4pPr marL="1600200" indent="-228600" eaLnBrk="0" hangingPunct="0">
+              <a:defRPr>
+                <a:solidFill>
+                  <a:schemeClr val="tx1"/>
+                </a:solidFill>
+                <a:latin typeface="Arial" charset="0"/>
+                <a:ea typeface="ＭＳ Ｐゴシック" charset="0"/>
+              </a:defRPr>
+            </a:lvl4pPr>
+            <a:lvl5pPr marL="2057400" indent="-228600" eaLnBrk="0" hangingPunct="0">
+              <a:defRPr>
+                <a:solidFill>
+                  <a:schemeClr val="tx1"/>
+                </a:solidFill>
+                <a:latin typeface="Arial" charset="0"/>
+                <a:ea typeface="ＭＳ Ｐゴシック" charset="0"/>
+              </a:defRPr>
+            </a:lvl5pPr>
+            <a:lvl6pPr marL="2514600" indent="-228600" eaLnBrk="0" fontAlgn="base" hangingPunct="0">
+              <a:spcBef>
+                <a:spcPct val="0"/>
+              </a:spcBef>
+              <a:spcAft>
+                <a:spcPct val="0"/>
+              </a:spcAft>
+              <a:defRPr>
+                <a:solidFill>
+                  <a:schemeClr val="tx1"/>
+                </a:solidFill>
+                <a:latin typeface="Arial" charset="0"/>
+                <a:ea typeface="ＭＳ Ｐゴシック" charset="0"/>
+              </a:defRPr>
+            </a:lvl6pPr>
+            <a:lvl7pPr marL="2971800" indent="-228600" eaLnBrk="0" fontAlgn="base" hangingPunct="0">
+              <a:spcBef>
+                <a:spcPct val="0"/>
+              </a:spcBef>
+              <a:spcAft>
+                <a:spcPct val="0"/>
+              </a:spcAft>
+              <a:defRPr>
+                <a:solidFill>
+                  <a:schemeClr val="tx1"/>
+                </a:solidFill>
+                <a:latin typeface="Arial" charset="0"/>
+                <a:ea typeface="ＭＳ Ｐゴシック" charset="0"/>
+              </a:defRPr>
+            </a:lvl7pPr>
+            <a:lvl8pPr marL="3429000" indent="-228600" eaLnBrk="0" fontAlgn="base" hangingPunct="0">
+              <a:spcBef>
+                <a:spcPct val="0"/>
+              </a:spcBef>
+              <a:spcAft>
+                <a:spcPct val="0"/>
+              </a:spcAft>
+              <a:defRPr>
+                <a:solidFill>
+                  <a:schemeClr val="tx1"/>
+                </a:solidFill>
+                <a:latin typeface="Arial" charset="0"/>
+                <a:ea typeface="ＭＳ Ｐゴシック" charset="0"/>
+              </a:defRPr>
+            </a:lvl8pPr>
+            <a:lvl9pPr marL="3886200" indent="-228600" eaLnBrk="0" fontAlgn="base" hangingPunct="0">
+              <a:spcBef>
+                <a:spcPct val="0"/>
+              </a:spcBef>
+              <a:spcAft>
+                <a:spcPct val="0"/>
+              </a:spcAft>
+              <a:defRPr>
+                <a:solidFill>
+                  <a:schemeClr val="tx1"/>
+                </a:solidFill>
+                <a:latin typeface="Arial" charset="0"/>
+                <a:ea typeface="ＭＳ Ｐゴシック" charset="0"/>
+              </a:defRPr>
+            </a:lvl9pPr>
+          </a:lstStyle>
+          <a:p>
+            <a:pPr eaLnBrk="1" hangingPunct="1"/>
+            <a:fld id="{56ACC338-D669-E640-9EE3-61ED3B9AC756}" type="slidenum">
+              <a:rPr lang="en-US">
+                <a:latin typeface="Tahoma" charset="0"/>
+              </a:rPr>
+              <a:pPr eaLnBrk="1" hangingPunct="1"/>
+              <a:t>18</a:t>
+            </a:fld>
+            <a:endParaRPr lang="en-US">
+              <a:latin typeface="Tahoma" charset="0"/>
+            </a:endParaRPr>
+          </a:p>
+        </p:txBody>
+      </p:sp>
+      <p:sp>
+        <p:nvSpPr>
+          <p:cNvPr id="37891" name="Rectangle 2"/>
+          <p:cNvSpPr>
+            <a:spLocks noGrp="1" noRot="1" noChangeAspect="1" noChangeArrowheads="1" noTextEdit="1"/>
+          </p:cNvSpPr>
+          <p:nvPr>
+            <p:ph type="sldImg"/>
+          </p:nvPr>
+        </p:nvSpPr>
+        <p:spPr>
+          <a:ln/>
+        </p:spPr>
+      </p:sp>
+      <p:sp>
+        <p:nvSpPr>
+          <p:cNvPr id="37892" name="Rectangle 3"/>
+          <p:cNvSpPr>
+            <a:spLocks noGrp="1" noChangeArrowheads="1"/>
+          </p:cNvSpPr>
+          <p:nvPr>
+            <p:ph type="body" idx="1"/>
+          </p:nvPr>
+        </p:nvSpPr>
+        <p:spPr>
+          <a:noFill/>
+          <a:ln/>
+          <a:extLst>
+            <a:ext uri="{909E8E84-426E-40DD-AFC4-6F175D3DCCD1}">
+              <a14:hiddenFill xmlns:a14="http://schemas.microsoft.com/office/drawing/2010/main">
+                <a:solidFill>
+                  <a:srgbClr val="FFFFFF"/>
+                </a:solidFill>
+              </a14:hiddenFill>
+            </a:ext>
+            <a:ext uri="{91240B29-F687-4F45-9708-019B960494DF}">
+              <a14:hiddenLine xmlns:a14="http://schemas.microsoft.com/office/drawing/2010/main" w="9525">
+                <a:solidFill>
+                  <a:srgbClr val="000000"/>
+                </a:solidFill>
+                <a:miter lim="800000"/>
+                <a:headEnd/>
+                <a:tailEnd/>
+              </a14:hiddenLine>
+            </a:ext>
+            <a:ext uri="{FAA26D3D-D897-4be2-8F04-BA451C77F1D7}">
+              <ma14:placeholderFlag xmlns:ma14="http://schemas.microsoft.com/office/mac/drawingml/2011/main" xmlns="" val="1"/>
+            </a:ext>
+          </a:extLst>
+        </p:spPr>
+        <p:txBody>
+          <a:bodyPr/>
+          <a:lstStyle/>
+          <a:p>
+            <a:pPr eaLnBrk="1" hangingPunct="1"/>
+            <a:endParaRPr lang="en-US">
+              <a:latin typeface="Times New Roman" charset="0"/>
+            </a:endParaRPr>
+          </a:p>
+        </p:txBody>
+      </p:sp>
+    </p:spTree>
+    <p:extLst>
+      <p:ext uri="{BB962C8B-B14F-4D97-AF65-F5344CB8AC3E}">
+        <p14:creationId xmlns:p14="http://schemas.microsoft.com/office/powerpoint/2010/main" val="2133155402"/>
       </p:ext>
     </p:extLst>
   </p:cSld>
@@ -2342,7 +2591,7 @@
               </a14:hiddenLine>
             </a:ext>
             <a:ext uri="{FAA26D3D-D897-4be2-8F04-BA451C77F1D7}">
-              <ma14:placeholderFlag xmlns="" xmlns:ma14="http://schemas.microsoft.com/office/mac/drawingml/2011/main" val="1"/>
+              <ma14:placeholderFlag xmlns:ma14="http://schemas.microsoft.com/office/mac/drawingml/2011/main" xmlns="" val="1"/>
             </a:ext>
           </a:extLst>
         </p:spPr>
@@ -2590,7 +2839,7 @@
               </a14:hiddenLine>
             </a:ext>
             <a:ext uri="{FAA26D3D-D897-4be2-8F04-BA451C77F1D7}">
-              <ma14:placeholderFlag xmlns="" xmlns:ma14="http://schemas.microsoft.com/office/mac/drawingml/2011/main" val="1"/>
+              <ma14:placeholderFlag xmlns:ma14="http://schemas.microsoft.com/office/mac/drawingml/2011/main" xmlns="" val="1"/>
             </a:ext>
           </a:extLst>
         </p:spPr>
@@ -2838,7 +3087,7 @@
               </a14:hiddenLine>
             </a:ext>
             <a:ext uri="{FAA26D3D-D897-4be2-8F04-BA451C77F1D7}">
-              <ma14:placeholderFlag xmlns="" xmlns:ma14="http://schemas.microsoft.com/office/mac/drawingml/2011/main" val="1"/>
+              <ma14:placeholderFlag xmlns:ma14="http://schemas.microsoft.com/office/mac/drawingml/2011/main" xmlns="" val="1"/>
             </a:ext>
           </a:extLst>
         </p:spPr>
@@ -3086,7 +3335,7 @@
               </a14:hiddenLine>
             </a:ext>
             <a:ext uri="{FAA26D3D-D897-4be2-8F04-BA451C77F1D7}">
-              <ma14:placeholderFlag xmlns="" xmlns:ma14="http://schemas.microsoft.com/office/mac/drawingml/2011/main" val="1"/>
+              <ma14:placeholderFlag xmlns:ma14="http://schemas.microsoft.com/office/mac/drawingml/2011/main" xmlns="" val="1"/>
             </a:ext>
           </a:extLst>
         </p:spPr>
@@ -3334,7 +3583,7 @@
               </a14:hiddenLine>
             </a:ext>
             <a:ext uri="{FAA26D3D-D897-4be2-8F04-BA451C77F1D7}">
-              <ma14:placeholderFlag xmlns="" xmlns:ma14="http://schemas.microsoft.com/office/mac/drawingml/2011/main" val="1"/>
+              <ma14:placeholderFlag xmlns:ma14="http://schemas.microsoft.com/office/mac/drawingml/2011/main" xmlns="" val="1"/>
             </a:ext>
           </a:extLst>
         </p:spPr>
@@ -3582,7 +3831,7 @@
               </a14:hiddenLine>
             </a:ext>
             <a:ext uri="{FAA26D3D-D897-4be2-8F04-BA451C77F1D7}">
-              <ma14:placeholderFlag xmlns="" xmlns:ma14="http://schemas.microsoft.com/office/mac/drawingml/2011/main" val="1"/>
+              <ma14:placeholderFlag xmlns:ma14="http://schemas.microsoft.com/office/mac/drawingml/2011/main" xmlns="" val="1"/>
             </a:ext>
           </a:extLst>
         </p:spPr>
@@ -3830,7 +4079,7 @@
               </a14:hiddenLine>
             </a:ext>
             <a:ext uri="{FAA26D3D-D897-4be2-8F04-BA451C77F1D7}">
-              <ma14:placeholderFlag xmlns="" xmlns:ma14="http://schemas.microsoft.com/office/mac/drawingml/2011/main" val="1"/>
+              <ma14:placeholderFlag xmlns:ma14="http://schemas.microsoft.com/office/mac/drawingml/2011/main" xmlns="" val="1"/>
             </a:ext>
           </a:extLst>
         </p:spPr>
@@ -4078,7 +4327,7 @@
               </a14:hiddenLine>
             </a:ext>
             <a:ext uri="{FAA26D3D-D897-4be2-8F04-BA451C77F1D7}">
-              <ma14:placeholderFlag xmlns="" xmlns:ma14="http://schemas.microsoft.com/office/mac/drawingml/2011/main" val="1"/>
+              <ma14:placeholderFlag xmlns:ma14="http://schemas.microsoft.com/office/mac/drawingml/2011/main" xmlns="" val="1"/>
             </a:ext>
           </a:extLst>
         </p:spPr>
@@ -24421,80 +24670,47 @@
           <a:lstStyle/>
           <a:p>
             <a:r>
+              <a:rPr lang="en-US" altLang="ja-JP" dirty="0"/>
+              <a:t>Internet (and likely search engine) use is now ubiquitous</a:t>
+            </a:r>
+          </a:p>
+          <a:p>
+            <a:pPr lvl="1"/>
+            <a:r>
+              <a:rPr lang="en-US" altLang="ja-JP" dirty="0"/>
+              <a:t>Not only in developed countries (Perrin, 2015) but across world </a:t>
+            </a:r>
+            <a:endParaRPr lang="en-US" altLang="ja-JP" dirty="0" smtClean="0"/>
+          </a:p>
+          <a:p>
+            <a:r>
               <a:rPr lang="en-US" altLang="ja-JP" dirty="0" smtClean="0"/>
-              <a:t>91% of US Internet users (73% of US adults) have used a search engine</a:t>
+              <a:t>71</a:t>
+            </a:r>
+            <a:r>
+              <a:rPr lang="en-US" altLang="ja-JP" dirty="0" smtClean="0"/>
+              <a:t>% of Internet users (59% of US adults) have searched for health information, with 35% using it for self-diagnosis</a:t>
+            </a:r>
+          </a:p>
+          <a:p>
+            <a:r>
+              <a:rPr lang="en-US" dirty="0" smtClean="0"/>
+              <a:t>“</a:t>
+            </a:r>
+            <a:r>
+              <a:rPr lang="en-US" dirty="0" smtClean="0"/>
+              <a:t>Search engine optimization” (SEO) is a key function used by many companies and organizations </a:t>
             </a:r>
           </a:p>
           <a:p>
             <a:pPr lvl="1"/>
             <a:r>
-              <a:rPr lang="en-US" altLang="ja-JP" dirty="0" smtClean="0"/>
-              <a:t>71% of Internet users (59% of US adults) have searched for health information, with 35% using it for self-diagnosis</a:t>
-            </a:r>
-          </a:p>
-          <a:p>
-            <a:pPr lvl="1"/>
-            <a:r>
-              <a:rPr lang="en-US" altLang="ja-JP" dirty="0" smtClean="0"/>
-              <a:t>US users now make up only 12% of world Internet population</a:t>
-            </a:r>
-          </a:p>
-          <a:p>
-            <a:r>
-              <a:rPr lang="en-US" altLang="ja-JP" dirty="0" smtClean="0"/>
-              <a:t>“</a:t>
-            </a:r>
-            <a:r>
               <a:rPr lang="en-US" dirty="0" smtClean="0"/>
-              <a:t>Search</a:t>
-            </a:r>
-            <a:r>
-              <a:rPr lang="en-US" altLang="ja-JP" dirty="0" smtClean="0"/>
-              <a:t>”</a:t>
+              <a:t>Some </a:t>
             </a:r>
             <a:r>
               <a:rPr lang="en-US" dirty="0" smtClean="0"/>
-              <a:t> is considered an </a:t>
-            </a:r>
-            <a:r>
-              <a:rPr lang="en-US" altLang="ja-JP" dirty="0" smtClean="0"/>
-              <a:t>“</a:t>
-            </a:r>
-            <a:r>
-              <a:rPr lang="en-US" dirty="0" smtClean="0"/>
-              <a:t>integral application</a:t>
-            </a:r>
-            <a:r>
-              <a:rPr lang="en-US" altLang="ja-JP" dirty="0" smtClean="0"/>
-              <a:t>”</a:t>
-            </a:r>
-            <a:endParaRPr lang="en-US" dirty="0" smtClean="0"/>
-          </a:p>
-          <a:p>
-            <a:pPr lvl="1"/>
-            <a:r>
-              <a:rPr lang="en-US" dirty="0" smtClean="0"/>
-              <a:t>Not only in libraries but also in enterprises and on individual computers and mobile devices</a:t>
-            </a:r>
-          </a:p>
-          <a:p>
-            <a:r>
-              <a:rPr lang="en-US" dirty="0" smtClean="0"/>
-              <a:t>“Search engine optimization” (SEO) is a key function used by many companies and organizations </a:t>
-            </a:r>
-          </a:p>
-          <a:p>
-            <a:pPr lvl="1"/>
-            <a:r>
-              <a:rPr lang="en-US" dirty="0" smtClean="0"/>
-              <a:t>Many are willing to pay </a:t>
-            </a:r>
-          </a:p>
-          <a:p>
-            <a:pPr lvl="1"/>
-            <a:r>
-              <a:rPr lang="en-US" dirty="0" smtClean="0"/>
-              <a:t>Some are lucky, e.g., last name of “Hersh”</a:t>
+              <a:t>are lucky, e.g., last name of “Hersh”</a:t>
             </a:r>
           </a:p>
         </p:txBody>
@@ -24521,7 +24737,15 @@
           <a:p>
             <a:r>
               <a:rPr lang="en-US" dirty="0"/>
-              <a:t>(Purcell, 2012), (Fox, 2013</a:t>
+              <a:t>(Purcell, </a:t>
+            </a:r>
+            <a:r>
+              <a:rPr lang="en-US" dirty="0" smtClean="0"/>
+              <a:t>2015), </a:t>
+            </a:r>
+            <a:r>
+              <a:rPr lang="en-US" dirty="0"/>
+              <a:t>(Fox, 2013</a:t>
             </a:r>
             <a:r>
               <a:rPr lang="en-US" dirty="0" smtClean="0"/>
@@ -24529,34 +24753,20 @@
             </a:r>
             <a:r>
               <a:rPr lang="en-US" altLang="ja-JP" dirty="0"/>
-              <a:t> (comScore, 2012</a:t>
-            </a:r>
-            <a:r>
-              <a:rPr lang="en-US" altLang="ja-JP" dirty="0" smtClean="0"/>
-              <a:t>), </a:t>
+              <a:t> </a:t>
             </a:r>
             <a:r>
               <a:rPr lang="en-US" dirty="0"/>
-              <a:t>(Barrows, 2006</a:t>
-            </a:r>
-            <a:r>
-              <a:rPr lang="en-US" dirty="0" smtClean="0"/>
-              <a:t>), </a:t>
+              <a:t>(</a:t>
+            </a:r>
+            <a:r>
+              <a:rPr lang="en-US" dirty="0" err="1"/>
+              <a:t>Moz</a:t>
             </a:r>
             <a:r>
               <a:rPr lang="en-US" dirty="0"/>
-              <a:t>(Google, 2010</a:t>
-            </a:r>
-            <a:r>
-              <a:rPr lang="en-US" dirty="0" smtClean="0"/>
-              <a:t>), </a:t>
-            </a:r>
-            <a:r>
-              <a:rPr lang="en-US" dirty="0"/>
-              <a:t>(Segal, 2011)</a:t>
-            </a:r>
-          </a:p>
-          <a:p>
+              <a:t>, 2015)</a:t>
+            </a:r>
             <a:endParaRPr lang="en-US" dirty="0"/>
           </a:p>
           <a:p>
@@ -27193,12 +27403,11 @@
           </a:bodyPr>
           <a:lstStyle/>
           <a:p>
-            <a:pPr eaLnBrk="1" hangingPunct="1"/>
             <a:r>
               <a:rPr lang="en-US" sz="4000" dirty="0">
                 <a:latin typeface="Calibri" charset="0"/>
               </a:rPr>
-              <a:t>Why is IR pertinent to health</a:t>
+              <a:t>How to find more information</a:t>
             </a:r>
             <a:r>
               <a:rPr lang="en-US" sz="4000" dirty="0">
@@ -27221,8 +27430,11 @@
               <a:rPr lang="en-US" sz="4000" dirty="0">
                 <a:latin typeface="Calibri" charset="0"/>
               </a:rPr>
-              <a:t>and biomedicine?</a:t>
-            </a:r>
+              <a:t>about IR in health and biomedicine</a:t>
+            </a:r>
+            <a:endParaRPr lang="en-US" sz="4000" dirty="0">
+              <a:latin typeface="Calibri" charset="0"/>
+            </a:endParaRPr>
           </a:p>
         </p:txBody>
       </p:sp>
@@ -27241,82 +27453,114 @@
           <a:bodyPr/>
           <a:lstStyle/>
           <a:p>
-            <a:pPr eaLnBrk="1" hangingPunct="1">
+            <a:pPr>
               <a:lnSpc>
-                <a:spcPct val="90000"/>
+                <a:spcPct val="80000"/>
               </a:lnSpc>
             </a:pPr>
             <a:r>
-              <a:rPr lang="en-US" sz="2400">
+              <a:rPr lang="en-US" sz="2600" dirty="0">
                 <a:latin typeface="Calibri" charset="0"/>
               </a:rPr>
-              <a:t>Growth of knowledge has long surpassed human memory capabilities</a:t>
-            </a:r>
-          </a:p>
-          <a:p>
-            <a:pPr eaLnBrk="1" hangingPunct="1">
+              <a:t>From me!</a:t>
+            </a:r>
+          </a:p>
+          <a:p>
+            <a:pPr>
               <a:lnSpc>
-                <a:spcPct val="90000"/>
+                <a:spcPct val="80000"/>
               </a:lnSpc>
             </a:pPr>
             <a:r>
-              <a:rPr lang="en-US" sz="2400">
+              <a:rPr lang="en-US" sz="2600" dirty="0">
                 <a:latin typeface="Calibri" charset="0"/>
               </a:rPr>
-              <a:t>Clinicians have frequent and unmet information needs</a:t>
-            </a:r>
-          </a:p>
-          <a:p>
-            <a:pPr eaLnBrk="1" hangingPunct="1">
+              <a:t>Hersh WR, </a:t>
+            </a:r>
+            <a:r>
+              <a:rPr lang="en-US" sz="2600" i="1" dirty="0">
+                <a:latin typeface="Calibri" charset="0"/>
+              </a:rPr>
+              <a:t>Information Retrieval: A Health and Biomedical Perspective</a:t>
+            </a:r>
+            <a:r>
+              <a:rPr lang="en-US" sz="2600" dirty="0">
+                <a:latin typeface="Calibri" charset="0"/>
+              </a:rPr>
+              <a:t>, Third Edition, 2009</a:t>
+            </a:r>
+          </a:p>
+          <a:p>
+            <a:pPr>
               <a:lnSpc>
-                <a:spcPct val="90000"/>
+                <a:spcPct val="80000"/>
               </a:lnSpc>
             </a:pPr>
             <a:r>
-              <a:rPr lang="en-US" sz="2400">
+              <a:rPr lang="en-US" sz="2600" dirty="0" smtClean="0">
                 <a:latin typeface="Calibri" charset="0"/>
               </a:rPr>
-              <a:t>Researchers must frequently update their knowledge in new areas quickly</a:t>
-            </a:r>
-          </a:p>
-          <a:p>
-            <a:pPr eaLnBrk="1" hangingPunct="1">
+              <a:t>Chapters </a:t>
+            </a:r>
+            <a:r>
+              <a:rPr lang="en-US" sz="2600" dirty="0">
+                <a:latin typeface="Calibri" charset="0"/>
+              </a:rPr>
+              <a:t>in other books, e.g., </a:t>
+            </a:r>
+            <a:r>
+              <a:rPr lang="en-US" sz="2600" dirty="0" err="1">
+                <a:latin typeface="Calibri" charset="0"/>
+              </a:rPr>
+              <a:t>Shortliffe</a:t>
+            </a:r>
+            <a:r>
+              <a:rPr lang="en-US" sz="2600" dirty="0">
+                <a:latin typeface="Calibri" charset="0"/>
+              </a:rPr>
+              <a:t> (2014), Sanchez-</a:t>
+            </a:r>
+            <a:r>
+              <a:rPr lang="en-US" sz="2600" dirty="0" err="1">
+                <a:latin typeface="Calibri" charset="0"/>
+              </a:rPr>
+              <a:t>Mendiola</a:t>
+            </a:r>
+            <a:r>
+              <a:rPr lang="en-US" sz="2600" dirty="0">
+                <a:latin typeface="Calibri" charset="0"/>
+              </a:rPr>
+              <a:t> (2014)</a:t>
+            </a:r>
+          </a:p>
+          <a:p>
+            <a:pPr>
               <a:lnSpc>
-                <a:spcPct val="90000"/>
+                <a:spcPct val="80000"/>
               </a:lnSpc>
             </a:pPr>
             <a:r>
-              <a:rPr lang="en-US" sz="2400">
+              <a:rPr lang="en-US" sz="2600" dirty="0">
                 <a:latin typeface="Calibri" charset="0"/>
               </a:rPr>
-              <a:t>Primary literature on a given topic can be scattered and hard to synthesize</a:t>
-            </a:r>
-          </a:p>
-          <a:p>
-            <a:pPr eaLnBrk="1" hangingPunct="1">
+              <a:t>OHSU BMI 514 – Information Retrieval</a:t>
+            </a:r>
+          </a:p>
+          <a:p>
+            <a:pPr>
               <a:lnSpc>
-                <a:spcPct val="90000"/>
+                <a:spcPct val="80000"/>
               </a:lnSpc>
             </a:pPr>
             <a:r>
-              <a:rPr lang="en-US" sz="2400">
+              <a:rPr lang="en-US" sz="2600" dirty="0">
                 <a:latin typeface="Calibri" charset="0"/>
               </a:rPr>
-              <a:t>Non-primary literature sources are often neither comprehensive nor systematic</a:t>
-            </a:r>
-          </a:p>
-          <a:p>
-            <a:pPr eaLnBrk="1" hangingPunct="1">
-              <a:lnSpc>
-                <a:spcPct val="90000"/>
-              </a:lnSpc>
-            </a:pPr>
-            <a:r>
-              <a:rPr lang="en-US" sz="2400">
-                <a:latin typeface="Calibri" charset="0"/>
-              </a:rPr>
-              <a:t>Web is increasingly used as source of health and biomedical information</a:t>
-            </a:r>
+              <a:t>Plenty of other books, journals, and other sources</a:t>
+            </a:r>
+            <a:endParaRPr lang="en-US" sz="2600" dirty="0">
+              <a:latin typeface="Calibri" charset="0"/>
+            </a:endParaRPr>
           </a:p>
         </p:txBody>
       </p:sp>
@@ -27340,6 +27584,191 @@
 </file>
 
 <file path=ppt/slides/slide18.xml><?xml version="1.0" encoding="utf-8"?>
+<p:sld xmlns:a="http://schemas.openxmlformats.org/drawingml/2006/main" xmlns:r="http://schemas.openxmlformats.org/officeDocument/2006/relationships" xmlns:p="http://schemas.openxmlformats.org/presentationml/2006/main">
+  <p:cSld>
+    <p:spTree>
+      <p:nvGrpSpPr>
+        <p:cNvPr id="1" name=""/>
+        <p:cNvGrpSpPr/>
+        <p:nvPr/>
+      </p:nvGrpSpPr>
+      <p:grpSpPr>
+        <a:xfrm>
+          <a:off x="0" y="0"/>
+          <a:ext cx="0" cy="0"/>
+          <a:chOff x="0" y="0"/>
+          <a:chExt cx="0" cy="0"/>
+        </a:xfrm>
+      </p:grpSpPr>
+      <p:sp>
+        <p:nvSpPr>
+          <p:cNvPr id="22530" name="Rectangle 9"/>
+          <p:cNvSpPr>
+            <a:spLocks noGrp="1" noChangeArrowheads="1"/>
+          </p:cNvSpPr>
+          <p:nvPr>
+            <p:ph type="title"/>
+          </p:nvPr>
+        </p:nvSpPr>
+        <p:spPr/>
+        <p:txBody>
+          <a:bodyPr>
+            <a:normAutofit fontScale="90000"/>
+          </a:bodyPr>
+          <a:lstStyle/>
+          <a:p>
+            <a:pPr eaLnBrk="1" hangingPunct="1"/>
+            <a:r>
+              <a:rPr lang="en-US" sz="4000" dirty="0">
+                <a:latin typeface="Calibri" charset="0"/>
+              </a:rPr>
+              <a:t>Why is IR pertinent to health</a:t>
+            </a:r>
+            <a:r>
+              <a:rPr lang="en-US" sz="4000" dirty="0">
+                <a:solidFill>
+                  <a:srgbClr val="FF00FF"/>
+                </a:solidFill>
+                <a:latin typeface="Calibri" charset="0"/>
+              </a:rPr>
+              <a:t/>
+            </a:r>
+            <a:br>
+              <a:rPr lang="en-US" sz="4000" dirty="0">
+                <a:solidFill>
+                  <a:srgbClr val="FF00FF"/>
+                </a:solidFill>
+                <a:latin typeface="Calibri" charset="0"/>
+              </a:rPr>
+            </a:br>
+            <a:r>
+              <a:rPr lang="en-US" sz="4000" dirty="0">
+                <a:latin typeface="Calibri" charset="0"/>
+              </a:rPr>
+              <a:t>and biomedicine?</a:t>
+            </a:r>
+          </a:p>
+        </p:txBody>
+      </p:sp>
+      <p:sp>
+        <p:nvSpPr>
+          <p:cNvPr id="22531" name="Rectangle 10"/>
+          <p:cNvSpPr>
+            <a:spLocks noGrp="1" noChangeArrowheads="1"/>
+          </p:cNvSpPr>
+          <p:nvPr>
+            <p:ph idx="1"/>
+          </p:nvPr>
+        </p:nvSpPr>
+        <p:spPr/>
+        <p:txBody>
+          <a:bodyPr/>
+          <a:lstStyle/>
+          <a:p>
+            <a:pPr eaLnBrk="1" hangingPunct="1">
+              <a:lnSpc>
+                <a:spcPct val="90000"/>
+              </a:lnSpc>
+            </a:pPr>
+            <a:r>
+              <a:rPr lang="en-US" sz="2400">
+                <a:latin typeface="Calibri" charset="0"/>
+              </a:rPr>
+              <a:t>Growth of knowledge has long surpassed human memory capabilities</a:t>
+            </a:r>
+          </a:p>
+          <a:p>
+            <a:pPr eaLnBrk="1" hangingPunct="1">
+              <a:lnSpc>
+                <a:spcPct val="90000"/>
+              </a:lnSpc>
+            </a:pPr>
+            <a:r>
+              <a:rPr lang="en-US" sz="2400">
+                <a:latin typeface="Calibri" charset="0"/>
+              </a:rPr>
+              <a:t>Clinicians have frequent and unmet information needs</a:t>
+            </a:r>
+          </a:p>
+          <a:p>
+            <a:pPr eaLnBrk="1" hangingPunct="1">
+              <a:lnSpc>
+                <a:spcPct val="90000"/>
+              </a:lnSpc>
+            </a:pPr>
+            <a:r>
+              <a:rPr lang="en-US" sz="2400">
+                <a:latin typeface="Calibri" charset="0"/>
+              </a:rPr>
+              <a:t>Researchers must frequently update their knowledge in new areas quickly</a:t>
+            </a:r>
+          </a:p>
+          <a:p>
+            <a:pPr eaLnBrk="1" hangingPunct="1">
+              <a:lnSpc>
+                <a:spcPct val="90000"/>
+              </a:lnSpc>
+            </a:pPr>
+            <a:r>
+              <a:rPr lang="en-US" sz="2400">
+                <a:latin typeface="Calibri" charset="0"/>
+              </a:rPr>
+              <a:t>Primary literature on a given topic can be scattered and hard to synthesize</a:t>
+            </a:r>
+          </a:p>
+          <a:p>
+            <a:pPr eaLnBrk="1" hangingPunct="1">
+              <a:lnSpc>
+                <a:spcPct val="90000"/>
+              </a:lnSpc>
+            </a:pPr>
+            <a:r>
+              <a:rPr lang="en-US" sz="2400">
+                <a:latin typeface="Calibri" charset="0"/>
+              </a:rPr>
+              <a:t>Non-primary literature sources are often neither comprehensive nor systematic</a:t>
+            </a:r>
+          </a:p>
+          <a:p>
+            <a:pPr eaLnBrk="1" hangingPunct="1">
+              <a:lnSpc>
+                <a:spcPct val="90000"/>
+              </a:lnSpc>
+            </a:pPr>
+            <a:r>
+              <a:rPr lang="en-US" sz="2400">
+                <a:latin typeface="Calibri" charset="0"/>
+              </a:rPr>
+              <a:t>Web is increasingly used as source of health and biomedical information</a:t>
+            </a:r>
+          </a:p>
+        </p:txBody>
+      </p:sp>
+    </p:spTree>
+    <p:custDataLst>
+      <p:tags r:id="rId1"/>
+    </p:custDataLst>
+    <p:extLst>
+      <p:ext uri="{BB962C8B-B14F-4D97-AF65-F5344CB8AC3E}">
+        <p14:creationId xmlns:p14="http://schemas.microsoft.com/office/powerpoint/2010/main" val="1449485624"/>
+      </p:ext>
+    </p:extLst>
+  </p:cSld>
+  <p:clrMapOvr>
+    <a:masterClrMapping/>
+  </p:clrMapOvr>
+  <p:transition/>
+  <p:timing>
+    <p:tnLst>
+      <p:par>
+        <p:cTn id="1" dur="indefinite" restart="never" nodeType="tmRoot"/>
+      </p:par>
+    </p:tnLst>
+  </p:timing>
+</p:sld>
+</file>
+
+<file path=ppt/slides/slide19.xml><?xml version="1.0" encoding="utf-8"?>
 <p:sld xmlns:a="http://schemas.openxmlformats.org/drawingml/2006/main" xmlns:r="http://schemas.openxmlformats.org/officeDocument/2006/relationships" xmlns:p="http://schemas.openxmlformats.org/presentationml/2006/main">
   <p:cSld>
     <p:spTree>
@@ -29247,16 +29676,16 @@
   <p:tag name="ARTICULATE_LMS" val="0"/>
   <p:tag name="ARTICULATE_META_COURSE_VERSION_SET" val="True"/>
   <p:tag name="ARTICULATE_REFERENCE_ID" val="185b4afc-6ede-428b-9794-a21207608289"/>
-  <p:tag name="ARTICULATE_SLIDE_COUNT" val="18"/>
   <p:tag name="ARTICULATE_REFERENCE_COUNT" val="0"/>
   <p:tag name="ARTICULATE_PLAYER_GLOSSARY_XML" val="&lt;?xml version=&quot;1.0&quot; encoding=&quot;utf-16&quot;?&gt;&lt;glossary xmlns:xsi=&quot;http://www.w3.org/2001/XMLSchema-instance&quot; xmlns:xsd=&quot;http://www.w3.org/2001/XMLSchema&quot;&gt;&lt;terms /&gt;&lt;/glossary&gt;"/>
-  <p:tag name="ARTICULATE_PROJECT_OPEN" val="1"/>
   <p:tag name="TAG_BACKING_FORM_KEY" val="2230154-c:\wamp\www\box sync\bd2k\oer content\bdk12\staged\bdk10-1.pptx"/>
   <p:tag name="ARTICULATE_PRESENTER_VERSION" val="7"/>
   <p:tag name="ARTICULATE_USED_PAGE_ORIENTATION" val="1"/>
   <p:tag name="ARTICULATE_USED_PAGE_SIZE" val="1"/>
   <p:tag name="ARTICULATE_META_COURSE_ID" val="4OTNCEhldmH_course_id"/>
   <p:tag name="ARTICULATE_META_NAME_SET" val="True"/>
+  <p:tag name="ARTICULATE_SLIDE_COUNT" val="19"/>
+  <p:tag name="ARTICULATE_PROJECT_OPEN" val="0"/>
 </p:tagLst>
 </file>
 
@@ -29523,6 +29952,7 @@
   <p:tag name="ARTICULATE_PLAYER_CONTROL_RESOURCES" val="False"/>
   <p:tag name="ELAPSEDTIME" val="12.532"/>
   <p:tag name="ARTICULATE_USED_LAYOUT" val="1"/>
+  <p:tag name="ARTICULATE_SLIDE_THUMBNAIL_REFRESH" val="1"/>
 </p:tagLst>
 </file>
 
@@ -29543,6 +29973,7 @@
   <p:tag name="ARTICULATE_PLAYER_CONTROL_NOTES" val="False"/>
   <p:tag name="ARTICULATE_PLAYER_CONTROL_RESOURCES" val="False"/>
   <p:tag name="ARTICULATE_USED_LAYOUT" val="22"/>
+  <p:tag name="ARTICULATE_SLIDE_THUMBNAIL_REFRESH" val="1"/>
 </p:tagLst>
 </file>
 
@@ -29585,6 +30016,7 @@
   <p:tag name="ARTICULATE_PLAYER_CONTROL_NOTES" val="False"/>
   <p:tag name="ARTICULATE_PLAYER_CONTROL_RESOURCES" val="False"/>
   <p:tag name="ARTICULATE_USED_LAYOUT" val="22"/>
+  <p:tag name="ARTICULATE_SLIDE_THUMBNAIL_REFRESH" val="1"/>
 </p:tagLst>
 </file>
 
@@ -29605,6 +30037,7 @@
   <p:tag name="ARTICULATE_PLAYER_CONTROL_NOTES" val="False"/>
   <p:tag name="ARTICULATE_PLAYER_CONTROL_RESOURCES" val="False"/>
   <p:tag name="ARTICULATE_USED_LAYOUT" val="23"/>
+  <p:tag name="ARTICULATE_SLIDE_THUMBNAIL_REFRESH" val="1"/>
 </p:tagLst>
 </file>
 
@@ -29641,6 +30074,7 @@
   <p:tag name="ARTICULATE_PLAYER_CONTROL_NOTES" val="False"/>
   <p:tag name="ARTICULATE_PLAYER_CONTROL_RESOURCES" val="False"/>
   <p:tag name="ARTICULATE_USED_LAYOUT" val="22"/>
+  <p:tag name="ARTICULATE_SLIDE_THUMBNAIL_REFRESH" val="1"/>
 </p:tagLst>
 </file>
 
@@ -29661,6 +30095,7 @@
   <p:tag name="ARTICULATE_PLAYER_CONTROL_NOTES" val="False"/>
   <p:tag name="ARTICULATE_PLAYER_CONTROL_RESOURCES" val="False"/>
   <p:tag name="ARTICULATE_USED_LAYOUT" val="23"/>
+  <p:tag name="ARTICULATE_SLIDE_THUMBNAIL_REFRESH" val="1"/>
 </p:tagLst>
 </file>
 
@@ -29681,6 +30116,7 @@
   <p:tag name="ARTICULATE_PLAYER_CONTROL_NOTES" val="False"/>
   <p:tag name="ARTICULATE_PLAYER_CONTROL_RESOURCES" val="False"/>
   <p:tag name="ARTICULATE_USED_LAYOUT" val="22"/>
+  <p:tag name="ARTICULATE_SLIDE_THUMBNAIL_REFRESH" val="1"/>
 </p:tagLst>
 </file>
 
@@ -29717,6 +30153,7 @@
   <p:tag name="ARTICULATE_PLAYER_CONTROL_NOTES" val="False"/>
   <p:tag name="ARTICULATE_PLAYER_CONTROL_RESOURCES" val="False"/>
   <p:tag name="ARTICULATE_USED_LAYOUT" val="2"/>
+  <p:tag name="ARTICULATE_SLIDE_THUMBNAIL_REFRESH" val="1"/>
 </p:tagLst>
 </file>
 
@@ -29737,6 +30174,7 @@
   <p:tag name="ARTICULATE_PLAYER_CONTROL_NOTES" val="False"/>
   <p:tag name="ARTICULATE_PLAYER_CONTROL_RESOURCES" val="False"/>
   <p:tag name="ARTICULATE_USED_LAYOUT" val="2"/>
+  <p:tag name="ARTICULATE_SLIDE_THUMBNAIL_REFRESH" val="1"/>
 </p:tagLst>
 </file>
 
@@ -29763,6 +30201,7 @@
   <p:tag name="ARTICULATE_PLAYER_CONTROL_NOTES" val="False"/>
   <p:tag name="ARTICULATE_PLAYER_CONTROL_RESOURCES" val="False"/>
   <p:tag name="ARTICULATE_USED_LAYOUT" val="2"/>
+  <p:tag name="ARTICULATE_SLIDE_THUMBNAIL_REFRESH" val="1"/>
 </p:tagLst>
 </file>
 
@@ -29783,6 +30222,7 @@
   <p:tag name="ARTICULATE_PLAYER_CONTROL_NOTES" val="False"/>
   <p:tag name="ARTICULATE_PLAYER_CONTROL_RESOURCES" val="False"/>
   <p:tag name="ARTICULATE_USED_LAYOUT" val="2"/>
+  <p:tag name="ARTICULATE_SLIDE_THUMBNAIL_REFRESH" val="1"/>
 </p:tagLst>
 </file>
 
@@ -29803,6 +30243,7 @@
   <p:tag name="ARTICULATE_PLAYER_CONTROL_NOTES" val="False"/>
   <p:tag name="ARTICULATE_PLAYER_CONTROL_RESOURCES" val="False"/>
   <p:tag name="ARTICULATE_USED_LAYOUT" val="2"/>
+  <p:tag name="ARTICULATE_SLIDE_THUMBNAIL_REFRESH" val="1"/>
 </p:tagLst>
 </file>
 
@@ -29839,10 +30280,32 @@
   <p:tag name="ARTICULATE_PLAYER_CONTROL_NOTES" val="False"/>
   <p:tag name="ARTICULATE_PLAYER_CONTROL_RESOURCES" val="False"/>
   <p:tag name="ARTICULATE_USED_LAYOUT" val="22"/>
+  <p:tag name="ARTICULATE_SLIDE_THUMBNAIL_REFRESH" val="1"/>
 </p:tagLst>
 </file>
 
 <file path=ppt/tags/tag65.xml><?xml version="1.0" encoding="utf-8"?>
+<p:tagLst xmlns:a="http://schemas.openxmlformats.org/drawingml/2006/main" xmlns:r="http://schemas.openxmlformats.org/officeDocument/2006/relationships" xmlns:p="http://schemas.openxmlformats.org/presentationml/2006/main">
+  <p:tag name="ARTICULATE_SLIDE_GUID" val="cdf69c38-1b68-4365-9154-421b0dec4579"/>
+  <p:tag name="ARTICULATE_SLIDE_NAV" val="14"/>
+  <p:tag name="AUDIO_ID" val="272"/>
+  <p:tag name="ARTICULATE_AUDIO_RECORDED" val="1"/>
+  <p:tag name="ELAPSEDTIME" val="112.7"/>
+  <p:tag name="ARTICULATE_NAV_LEVEL" val="1"/>
+  <p:tag name="ARTICULATE_SLIDE_PRESENTER_GUID" val="0ee4c49e-74c1-47b3-9ecc-442e37a43e9f"/>
+  <p:tag name="ARTICULATE_SLIDE_PAUSE" val="0"/>
+  <p:tag name="ARTICULATE_LOCK_SLIDE" val="0"/>
+  <p:tag name="ARTICULATE_HIDE_SLIDE" val="0"/>
+  <p:tag name="ARTICULATE_PLAYER_CONTROL_PREVIOUS" val="True"/>
+  <p:tag name="ARTICULATE_PLAYER_CONTROL_NEXT" val="True"/>
+  <p:tag name="ARTICULATE_PLAYER_CONTROL_NOTES" val="False"/>
+  <p:tag name="ARTICULATE_PLAYER_CONTROL_RESOURCES" val="False"/>
+  <p:tag name="ARTICULATE_USED_LAYOUT" val="22"/>
+  <p:tag name="ARTICULATE_SLIDE_THUMBNAIL_REFRESH" val="1"/>
+</p:tagLst>
+</file>
+
+<file path=ppt/tags/tag66.xml><?xml version="1.0" encoding="utf-8"?>
 <p:tagLst xmlns:a="http://schemas.openxmlformats.org/drawingml/2006/main" xmlns:r="http://schemas.openxmlformats.org/officeDocument/2006/relationships" xmlns:p="http://schemas.openxmlformats.org/presentationml/2006/main">
   <p:tag name="ARTICULATE_NAV_LEVEL" val="1"/>
   <p:tag name="ARTICULATE_SLIDE_PRESENTER_GUID" val="0ee4c49e-74c1-47b3-9ecc-442e37a43e9f"/>

</xml_diff>